<commit_message>
Präsentation erweitert + userview tabelle erstellt
</commit_message>
<xml_diff>
--- a/Präsentation.pptx
+++ b/Präsentation.pptx
@@ -5,10 +5,10 @@
     <p:sldMasterId id="2147483742" r:id="rId2"/>
   </p:sldMasterIdLst>
   <p:notesMasterIdLst>
-    <p:notesMasterId r:id="rId12"/>
+    <p:notesMasterId r:id="rId14"/>
   </p:notesMasterIdLst>
   <p:handoutMasterIdLst>
-    <p:handoutMasterId r:id="rId13"/>
+    <p:handoutMasterId r:id="rId15"/>
   </p:handoutMasterIdLst>
   <p:sldIdLst>
     <p:sldId id="265" r:id="rId3"/>
@@ -19,7 +19,9 @@
     <p:sldId id="269" r:id="rId8"/>
     <p:sldId id="276" r:id="rId9"/>
     <p:sldId id="282" r:id="rId10"/>
-    <p:sldId id="280" r:id="rId11"/>
+    <p:sldId id="283" r:id="rId11"/>
+    <p:sldId id="284" r:id="rId12"/>
+    <p:sldId id="280" r:id="rId13"/>
   </p:sldIdLst>
   <p:sldSz cx="12192000" cy="6858000"/>
   <p:notesSz cx="6858000" cy="9144000"/>
@@ -8209,7 +8211,7 @@
             <a:fld id="{41658A34-83F4-4B2E-BC5A-DE51EE8822F9}" type="datetimeFigureOut">
               <a:rPr lang="en-US" smtClean="0"/>
               <a:pPr/>
-              <a:t>5/2/2021</a:t>
+              <a:t>5/5/2021</a:t>
             </a:fld>
             <a:endParaRPr lang="en-US"/>
           </a:p>
@@ -8376,7 +8378,7 @@
             <a:fld id="{7F2E1917-0BAF-4687-978A-82FFF05559C3}" type="datetimeFigureOut">
               <a:rPr lang="en-US" smtClean="0"/>
               <a:pPr/>
-              <a:t>5/2/2021</a:t>
+              <a:t>5/5/2021</a:t>
             </a:fld>
             <a:endParaRPr lang="en-US"/>
           </a:p>
@@ -8720,6 +8722,91 @@
     <p:extLst>
       <p:ext uri="{BB962C8B-B14F-4D97-AF65-F5344CB8AC3E}">
         <p14:creationId xmlns:p14="http://schemas.microsoft.com/office/powerpoint/2010/main" val="1807123478"/>
+      </p:ext>
+    </p:extLst>
+  </p:cSld>
+  <p:clrMapOvr>
+    <a:masterClrMapping/>
+  </p:clrMapOvr>
+</p:notes>
+</file>
+
+<file path=ppt/notesSlides/notesSlide2.xml><?xml version="1.0" encoding="utf-8"?>
+<p:notes xmlns:a="http://schemas.openxmlformats.org/drawingml/2006/main" xmlns:r="http://schemas.openxmlformats.org/officeDocument/2006/relationships" xmlns:p="http://schemas.openxmlformats.org/presentationml/2006/main">
+  <p:cSld>
+    <p:spTree>
+      <p:nvGrpSpPr>
+        <p:cNvPr id="1" name=""/>
+        <p:cNvGrpSpPr/>
+        <p:nvPr/>
+      </p:nvGrpSpPr>
+      <p:grpSpPr>
+        <a:xfrm>
+          <a:off x="0" y="0"/>
+          <a:ext cx="0" cy="0"/>
+          <a:chOff x="0" y="0"/>
+          <a:chExt cx="0" cy="0"/>
+        </a:xfrm>
+      </p:grpSpPr>
+      <p:sp>
+        <p:nvSpPr>
+          <p:cNvPr id="2" name="Folienbildplatzhalter 1"/>
+          <p:cNvSpPr>
+            <a:spLocks noGrp="1" noRot="1" noChangeAspect="1"/>
+          </p:cNvSpPr>
+          <p:nvPr>
+            <p:ph type="sldImg"/>
+          </p:nvPr>
+        </p:nvSpPr>
+        <p:spPr/>
+      </p:sp>
+      <p:sp>
+        <p:nvSpPr>
+          <p:cNvPr id="3" name="Notizenplatzhalter 2"/>
+          <p:cNvSpPr>
+            <a:spLocks noGrp="1"/>
+          </p:cNvSpPr>
+          <p:nvPr>
+            <p:ph type="body" idx="1"/>
+          </p:nvPr>
+        </p:nvSpPr>
+        <p:spPr/>
+        <p:txBody>
+          <a:bodyPr/>
+          <a:lstStyle/>
+          <a:p>
+            <a:endParaRPr lang="de-DE" dirty="0"/>
+          </a:p>
+        </p:txBody>
+      </p:sp>
+      <p:sp>
+        <p:nvSpPr>
+          <p:cNvPr id="4" name="Foliennummernplatzhalter 3"/>
+          <p:cNvSpPr>
+            <a:spLocks noGrp="1"/>
+          </p:cNvSpPr>
+          <p:nvPr>
+            <p:ph type="sldNum" sz="quarter" idx="5"/>
+          </p:nvPr>
+        </p:nvSpPr>
+        <p:spPr/>
+        <p:txBody>
+          <a:bodyPr/>
+          <a:lstStyle/>
+          <a:p>
+            <a:fld id="{810E1E9A-E921-4174-A0FC-51868D7AC568}" type="slidenum">
+              <a:rPr lang="en-US" smtClean="0"/>
+              <a:pPr/>
+              <a:t>9</a:t>
+            </a:fld>
+            <a:endParaRPr lang="en-US"/>
+          </a:p>
+        </p:txBody>
+      </p:sp>
+    </p:spTree>
+    <p:extLst>
+      <p:ext uri="{BB962C8B-B14F-4D97-AF65-F5344CB8AC3E}">
+        <p14:creationId xmlns:p14="http://schemas.microsoft.com/office/powerpoint/2010/main" val="1037127657"/>
       </p:ext>
     </p:extLst>
   </p:cSld>
@@ -9133,7 +9220,7 @@
             <a:fld id="{84EAB7D7-3608-4730-B2E2-670834DF882C}" type="datetimeFigureOut">
               <a:rPr lang="en-US" smtClean="0"/>
               <a:pPr/>
-              <a:t>5/2/2021</a:t>
+              <a:t>5/5/2021</a:t>
             </a:fld>
             <a:endParaRPr lang="en-US"/>
           </a:p>
@@ -9314,7 +9401,7 @@
             <a:fld id="{84EAB7D7-3608-4730-B2E2-670834DF882C}" type="datetimeFigureOut">
               <a:rPr lang="en-US" smtClean="0"/>
               <a:pPr/>
-              <a:t>5/2/2021</a:t>
+              <a:t>5/5/2021</a:t>
             </a:fld>
             <a:endParaRPr lang="en-US"/>
           </a:p>
@@ -9496,7 +9583,7 @@
             <a:fld id="{84EAB7D7-3608-4730-B2E2-670834DF882C}" type="datetimeFigureOut">
               <a:rPr lang="en-US" smtClean="0"/>
               <a:pPr/>
-              <a:t>5/2/2021</a:t>
+              <a:t>5/5/2021</a:t>
             </a:fld>
             <a:endParaRPr lang="en-US"/>
           </a:p>
@@ -9593,7 +9680,7 @@
             <a:fld id="{84EAB7D7-3608-4730-B2E2-670834DF882C}" type="datetimeFigureOut">
               <a:rPr lang="en-US" smtClean="0"/>
               <a:pPr/>
-              <a:t>5/2/2021</a:t>
+              <a:t>5/5/2021</a:t>
             </a:fld>
             <a:endParaRPr lang="en-US"/>
           </a:p>
@@ -9937,7 +10024,7 @@
             <a:fld id="{84EAB7D7-3608-4730-B2E2-670834DF882C}" type="datetimeFigureOut">
               <a:rPr lang="en-US" smtClean="0"/>
               <a:pPr/>
-              <a:t>5/2/2021</a:t>
+              <a:t>5/5/2021</a:t>
             </a:fld>
             <a:endParaRPr lang="en-US"/>
           </a:p>
@@ -10252,7 +10339,7 @@
             <a:fld id="{84EAB7D7-3608-4730-B2E2-670834DF882C}" type="datetimeFigureOut">
               <a:rPr lang="en-US" smtClean="0"/>
               <a:pPr/>
-              <a:t>5/2/2021</a:t>
+              <a:t>5/5/2021</a:t>
             </a:fld>
             <a:endParaRPr lang="en-US"/>
           </a:p>
@@ -10640,7 +10727,7 @@
             <a:fld id="{84EAB7D7-3608-4730-B2E2-670834DF882C}" type="datetimeFigureOut">
               <a:rPr lang="en-US" smtClean="0"/>
               <a:pPr/>
-              <a:t>5/2/2021</a:t>
+              <a:t>5/5/2021</a:t>
             </a:fld>
             <a:endParaRPr lang="en-US"/>
           </a:p>
@@ -11076,7 +11163,7 @@
             <a:fld id="{84EAB7D7-3608-4730-B2E2-670834DF882C}" type="datetimeFigureOut">
               <a:rPr lang="en-US" smtClean="0"/>
               <a:pPr/>
-              <a:t>5/2/2021</a:t>
+              <a:t>5/5/2021</a:t>
             </a:fld>
             <a:endParaRPr lang="en-US"/>
           </a:p>
@@ -11196,7 +11283,7 @@
             <a:fld id="{84EAB7D7-3608-4730-B2E2-670834DF882C}" type="datetimeFigureOut">
               <a:rPr lang="en-US" smtClean="0"/>
               <a:pPr/>
-              <a:t>5/2/2021</a:t>
+              <a:t>5/5/2021</a:t>
             </a:fld>
             <a:endParaRPr lang="en-US"/>
           </a:p>
@@ -11293,7 +11380,7 @@
             <a:fld id="{84EAB7D7-3608-4730-B2E2-670834DF882C}" type="datetimeFigureOut">
               <a:rPr lang="en-US" smtClean="0"/>
               <a:pPr/>
-              <a:t>5/2/2021</a:t>
+              <a:t>5/5/2021</a:t>
             </a:fld>
             <a:endParaRPr lang="en-US"/>
           </a:p>
@@ -11645,7 +11732,7 @@
             <a:fld id="{84EAB7D7-3608-4730-B2E2-670834DF882C}" type="datetimeFigureOut">
               <a:rPr lang="en-US" smtClean="0"/>
               <a:pPr/>
-              <a:t>5/2/2021</a:t>
+              <a:t>5/5/2021</a:t>
             </a:fld>
             <a:endParaRPr lang="en-US"/>
           </a:p>
@@ -12072,7 +12159,7 @@
             <a:fld id="{84EAB7D7-3608-4730-B2E2-670834DF882C}" type="datetimeFigureOut">
               <a:rPr lang="en-US" smtClean="0"/>
               <a:pPr/>
-              <a:t>5/2/2021</a:t>
+              <a:t>5/5/2021</a:t>
             </a:fld>
             <a:endParaRPr lang="en-US"/>
           </a:p>
@@ -12355,7 +12442,7 @@
             <a:fld id="{84EAB7D7-3608-4730-B2E2-670834DF882C}" type="datetimeFigureOut">
               <a:rPr lang="en-US" smtClean="0"/>
               <a:pPr/>
-              <a:t>5/2/2021</a:t>
+              <a:t>5/5/2021</a:t>
             </a:fld>
             <a:endParaRPr lang="en-US"/>
           </a:p>
@@ -13079,6 +13166,236 @@
         <p14:creationId xmlns:p14="http://schemas.microsoft.com/office/powerpoint/2010/main" val="923078003"/>
       </p:ext>
     </p:extLst>
+  </p:cSld>
+  <p:clrMapOvr>
+    <a:masterClrMapping/>
+  </p:clrMapOvr>
+  <mc:AlternateContent xmlns:mc="http://schemas.openxmlformats.org/markup-compatibility/2006" xmlns:p14="http://schemas.microsoft.com/office/powerpoint/2010/main">
+    <mc:Choice Requires="p14">
+      <p:transition spd="med" p14:dur="700">
+        <p:fade/>
+      </p:transition>
+    </mc:Choice>
+    <mc:Fallback xmlns="">
+      <p:transition spd="med">
+        <p:fade/>
+      </p:transition>
+    </mc:Fallback>
+  </mc:AlternateContent>
+</p:sld>
+</file>
+
+<file path=ppt/slides/slide10.xml><?xml version="1.0" encoding="utf-8"?>
+<p:sld xmlns:a="http://schemas.openxmlformats.org/drawingml/2006/main" xmlns:r="http://schemas.openxmlformats.org/officeDocument/2006/relationships" xmlns:p="http://schemas.openxmlformats.org/presentationml/2006/main">
+  <p:cSld>
+    <p:spTree>
+      <p:nvGrpSpPr>
+        <p:cNvPr id="1" name=""/>
+        <p:cNvGrpSpPr/>
+        <p:nvPr/>
+      </p:nvGrpSpPr>
+      <p:grpSpPr>
+        <a:xfrm>
+          <a:off x="0" y="0"/>
+          <a:ext cx="0" cy="0"/>
+          <a:chOff x="0" y="0"/>
+          <a:chExt cx="0" cy="0"/>
+        </a:xfrm>
+      </p:grpSpPr>
+      <p:sp>
+        <p:nvSpPr>
+          <p:cNvPr id="13" name="Title 12"/>
+          <p:cNvSpPr>
+            <a:spLocks noGrp="1"/>
+          </p:cNvSpPr>
+          <p:nvPr>
+            <p:ph type="title"/>
+          </p:nvPr>
+        </p:nvSpPr>
+        <p:spPr/>
+        <p:txBody>
+          <a:bodyPr/>
+          <a:lstStyle/>
+          <a:p>
+            <a:r>
+              <a:rPr lang="en-US" dirty="0"/>
+              <a:t>Non Functional Requirements	</a:t>
+            </a:r>
+          </a:p>
+        </p:txBody>
+      </p:sp>
+      <p:sp>
+        <p:nvSpPr>
+          <p:cNvPr id="14" name="Content Placeholder 13"/>
+          <p:cNvSpPr>
+            <a:spLocks noGrp="1"/>
+          </p:cNvSpPr>
+          <p:nvPr>
+            <p:ph idx="1"/>
+          </p:nvPr>
+        </p:nvSpPr>
+        <p:spPr/>
+        <p:txBody>
+          <a:bodyPr>
+            <a:normAutofit/>
+          </a:bodyPr>
+          <a:lstStyle/>
+          <a:p>
+            <a:pPr marL="457200" lvl="0" indent="-457200">
+              <a:buFont typeface="+mj-lt"/>
+              <a:buAutoNum type="arabicPeriod"/>
+            </a:pPr>
+            <a:r>
+              <a:rPr lang="en-US" dirty="0"/>
+              <a:t>Reachable through the internet</a:t>
+            </a:r>
+          </a:p>
+          <a:p>
+            <a:pPr marL="457200" lvl="0" indent="-457200">
+              <a:buFont typeface="+mj-lt"/>
+              <a:buAutoNum type="arabicPeriod"/>
+            </a:pPr>
+            <a:r>
+              <a:rPr lang="en-US" dirty="0"/>
+              <a:t>Easy to install</a:t>
+            </a:r>
+          </a:p>
+          <a:p>
+            <a:pPr marL="457200" lvl="0" indent="-457200">
+              <a:buFont typeface="+mj-lt"/>
+              <a:buAutoNum type="arabicPeriod"/>
+            </a:pPr>
+            <a:r>
+              <a:rPr lang="en-US" dirty="0"/>
+              <a:t>Responsive web design</a:t>
+            </a:r>
+          </a:p>
+          <a:p>
+            <a:pPr marL="457200" lvl="0" indent="-457200">
+              <a:buFont typeface="+mj-lt"/>
+              <a:buAutoNum type="arabicPeriod"/>
+            </a:pPr>
+            <a:r>
+              <a:rPr lang="en-US" dirty="0"/>
+              <a:t>High availability</a:t>
+            </a:r>
+          </a:p>
+          <a:p>
+            <a:pPr marL="457200" lvl="0" indent="-457200">
+              <a:buFont typeface="+mj-lt"/>
+              <a:buAutoNum type="arabicPeriod"/>
+            </a:pPr>
+            <a:r>
+              <a:rPr lang="en-US" dirty="0"/>
+              <a:t>Encrypted passwords</a:t>
+            </a:r>
+          </a:p>
+          <a:p>
+            <a:pPr marL="457200" lvl="0" indent="-457200">
+              <a:buFont typeface="+mj-lt"/>
+              <a:buAutoNum type="arabicPeriod"/>
+            </a:pPr>
+            <a:r>
+              <a:rPr lang="en-US" dirty="0"/>
+              <a:t>HTTPS protocol</a:t>
+            </a:r>
+          </a:p>
+          <a:p>
+            <a:pPr marL="457200" lvl="0" indent="-457200">
+              <a:buFont typeface="+mj-lt"/>
+              <a:buAutoNum type="arabicPeriod"/>
+            </a:pPr>
+            <a:r>
+              <a:rPr lang="en-US" dirty="0"/>
+              <a:t>High performance</a:t>
+            </a:r>
+          </a:p>
+        </p:txBody>
+      </p:sp>
+    </p:spTree>
+    <p:extLst>
+      <p:ext uri="{BB962C8B-B14F-4D97-AF65-F5344CB8AC3E}">
+        <p14:creationId xmlns:p14="http://schemas.microsoft.com/office/powerpoint/2010/main" val="2957792309"/>
+      </p:ext>
+    </p:extLst>
+  </p:cSld>
+  <p:clrMapOvr>
+    <a:masterClrMapping/>
+  </p:clrMapOvr>
+  <mc:AlternateContent xmlns:mc="http://schemas.openxmlformats.org/markup-compatibility/2006">
+    <mc:Choice xmlns:p14="http://schemas.microsoft.com/office/powerpoint/2010/main" Requires="p14">
+      <p:transition spd="med" p14:dur="700">
+        <p:fade/>
+      </p:transition>
+    </mc:Choice>
+    <mc:Fallback>
+      <p:transition spd="med">
+        <p:fade/>
+      </p:transition>
+    </mc:Fallback>
+  </mc:AlternateContent>
+</p:sld>
+</file>
+
+<file path=ppt/slides/slide11.xml><?xml version="1.0" encoding="utf-8"?>
+<p:sld xmlns:a="http://schemas.openxmlformats.org/drawingml/2006/main" xmlns:r="http://schemas.openxmlformats.org/officeDocument/2006/relationships" xmlns:p="http://schemas.openxmlformats.org/presentationml/2006/main">
+  <p:cSld>
+    <p:spTree>
+      <p:nvGrpSpPr>
+        <p:cNvPr id="1" name=""/>
+        <p:cNvGrpSpPr/>
+        <p:nvPr/>
+      </p:nvGrpSpPr>
+      <p:grpSpPr>
+        <a:xfrm>
+          <a:off x="0" y="0"/>
+          <a:ext cx="0" cy="0"/>
+          <a:chOff x="0" y="0"/>
+          <a:chExt cx="0" cy="0"/>
+        </a:xfrm>
+      </p:grpSpPr>
+      <p:sp>
+        <p:nvSpPr>
+          <p:cNvPr id="3" name="Title 2"/>
+          <p:cNvSpPr>
+            <a:spLocks noGrp="1"/>
+          </p:cNvSpPr>
+          <p:nvPr>
+            <p:ph type="title"/>
+          </p:nvPr>
+        </p:nvSpPr>
+        <p:spPr/>
+        <p:txBody>
+          <a:bodyPr/>
+          <a:lstStyle/>
+          <a:p>
+            <a:r>
+              <a:rPr lang="en-US" dirty="0"/>
+              <a:t>Questions &amp; Discussion</a:t>
+            </a:r>
+          </a:p>
+        </p:txBody>
+      </p:sp>
+      <p:sp>
+        <p:nvSpPr>
+          <p:cNvPr id="2" name="Text Placeholder 1"/>
+          <p:cNvSpPr>
+            <a:spLocks noGrp="1"/>
+          </p:cNvSpPr>
+          <p:nvPr>
+            <p:ph type="body" idx="1"/>
+          </p:nvPr>
+        </p:nvSpPr>
+        <p:spPr/>
+        <p:txBody>
+          <a:bodyPr/>
+          <a:lstStyle/>
+          <a:p>
+            <a:endParaRPr lang="en-US"/>
+          </a:p>
+        </p:txBody>
+      </p:sp>
+    </p:spTree>
   </p:cSld>
   <p:clrMapOvr>
     <a:masterClrMapping/>
@@ -14537,9 +14854,159 @@
         <p:spPr/>
         <p:txBody>
           <a:bodyPr>
-            <a:normAutofit/>
+            <a:normAutofit fontScale="85000" lnSpcReduction="20000"/>
           </a:bodyPr>
           <a:lstStyle/>
+          <a:p>
+            <a:pPr lvl="0"/>
+            <a:r>
+              <a:rPr lang="en-US" dirty="0"/>
+              <a:t>As an employee of </a:t>
+            </a:r>
+            <a:r>
+              <a:rPr lang="en-US" dirty="0" err="1"/>
+              <a:t>DreamHome</a:t>
+            </a:r>
+            <a:r>
+              <a:rPr lang="en-US" dirty="0"/>
+              <a:t> I want to log in to the application</a:t>
+            </a:r>
+          </a:p>
+          <a:p>
+            <a:pPr lvl="0"/>
+            <a:r>
+              <a:rPr lang="en-US" dirty="0"/>
+              <a:t>As an employee of </a:t>
+            </a:r>
+            <a:r>
+              <a:rPr lang="en-US" dirty="0" err="1"/>
+              <a:t>DreamHome</a:t>
+            </a:r>
+            <a:r>
+              <a:rPr lang="en-US" dirty="0"/>
+              <a:t> I want to see which tenant has paid his lease completely and which did not</a:t>
+            </a:r>
+          </a:p>
+          <a:p>
+            <a:pPr lvl="0"/>
+            <a:r>
+              <a:rPr lang="en-US" dirty="0"/>
+              <a:t>As an employee of </a:t>
+            </a:r>
+            <a:r>
+              <a:rPr lang="en-US" dirty="0" err="1"/>
+              <a:t>DreamHome</a:t>
+            </a:r>
+            <a:r>
+              <a:rPr lang="en-US" dirty="0"/>
+              <a:t> I want to export the utility bill for each tenant</a:t>
+            </a:r>
+          </a:p>
+          <a:p>
+            <a:pPr lvl="0"/>
+            <a:r>
+              <a:rPr lang="en-US" dirty="0"/>
+              <a:t>As an employee of </a:t>
+            </a:r>
+            <a:r>
+              <a:rPr lang="en-US" dirty="0" err="1"/>
+              <a:t>DreamHome</a:t>
+            </a:r>
+            <a:r>
+              <a:rPr lang="en-US" dirty="0"/>
+              <a:t> I want to import bank statements which get automatically converted into the proper data for the system  </a:t>
+            </a:r>
+          </a:p>
+          <a:p>
+            <a:pPr lvl="0"/>
+            <a:r>
+              <a:rPr lang="en-US" dirty="0"/>
+              <a:t>As an employee of </a:t>
+            </a:r>
+            <a:r>
+              <a:rPr lang="en-US" dirty="0" err="1"/>
+              <a:t>DreamHome</a:t>
+            </a:r>
+            <a:r>
+              <a:rPr lang="en-US" dirty="0"/>
+              <a:t> I want to send reminders to the tenants if they missed their payments</a:t>
+            </a:r>
+          </a:p>
+          <a:p>
+            <a:pPr lvl="0"/>
+            <a:r>
+              <a:rPr lang="en-US" dirty="0"/>
+              <a:t>As an employee of </a:t>
+            </a:r>
+            <a:r>
+              <a:rPr lang="en-US" dirty="0" err="1"/>
+              <a:t>DreamHome</a:t>
+            </a:r>
+            <a:r>
+              <a:rPr lang="en-US" dirty="0"/>
+              <a:t>  I want to add/remove/edit properties</a:t>
+            </a:r>
+          </a:p>
+          <a:p>
+            <a:pPr lvl="0"/>
+            <a:r>
+              <a:rPr lang="en-US" dirty="0"/>
+              <a:t>As an employee of </a:t>
+            </a:r>
+            <a:r>
+              <a:rPr lang="en-US" dirty="0" err="1"/>
+              <a:t>DreamHome</a:t>
+            </a:r>
+            <a:r>
+              <a:rPr lang="en-US" dirty="0"/>
+              <a:t>  I want to add/remove/edit tenants</a:t>
+            </a:r>
+          </a:p>
+          <a:p>
+            <a:pPr lvl="0"/>
+            <a:r>
+              <a:rPr lang="en-US" dirty="0"/>
+              <a:t>As an employee of </a:t>
+            </a:r>
+            <a:r>
+              <a:rPr lang="en-US" dirty="0" err="1"/>
+              <a:t>DreamHome</a:t>
+            </a:r>
+            <a:r>
+              <a:rPr lang="en-US" dirty="0"/>
+              <a:t> I want to add/remove/edit contracts</a:t>
+            </a:r>
+          </a:p>
+          <a:p>
+            <a:pPr lvl="0"/>
+            <a:r>
+              <a:rPr lang="en-US" dirty="0"/>
+              <a:t>As an manager of </a:t>
+            </a:r>
+            <a:r>
+              <a:rPr lang="en-US" dirty="0" err="1"/>
+              <a:t>DreamHome</a:t>
+            </a:r>
+            <a:r>
+              <a:rPr lang="en-US" dirty="0"/>
+              <a:t> I want to add/remove/edit employees</a:t>
+            </a:r>
+          </a:p>
+          <a:p>
+            <a:pPr lvl="0"/>
+            <a:r>
+              <a:rPr lang="en-US" dirty="0"/>
+              <a:t>As an manager of </a:t>
+            </a:r>
+            <a:r>
+              <a:rPr lang="en-US" dirty="0" err="1"/>
+              <a:t>DreamHome</a:t>
+            </a:r>
+            <a:r>
+              <a:rPr lang="en-US" dirty="0"/>
+              <a:t> I want to add/remove/edit owners</a:t>
+            </a:r>
+          </a:p>
           <a:p>
             <a:pPr lvl="0"/>
             <a:endParaRPr lang="en-US" dirty="0"/>
@@ -14590,7 +15057,7 @@
       </p:grpSpPr>
       <p:sp>
         <p:nvSpPr>
-          <p:cNvPr id="3" name="Title 2"/>
+          <p:cNvPr id="13" name="Title 12"/>
           <p:cNvSpPr>
             <a:spLocks noGrp="1"/>
           </p:cNvSpPr>
@@ -14605,42 +15072,106 @@
           <a:p>
             <a:r>
               <a:rPr lang="en-US" dirty="0"/>
-              <a:t>Questions &amp; Discussion</a:t>
+              <a:t>Functional Requirements	</a:t>
             </a:r>
           </a:p>
         </p:txBody>
       </p:sp>
       <p:sp>
         <p:nvSpPr>
-          <p:cNvPr id="2" name="Text Placeholder 1"/>
+          <p:cNvPr id="14" name="Content Placeholder 13"/>
           <p:cNvSpPr>
             <a:spLocks noGrp="1"/>
           </p:cNvSpPr>
           <p:nvPr>
-            <p:ph type="body" idx="1"/>
+            <p:ph idx="1"/>
           </p:nvPr>
         </p:nvSpPr>
         <p:spPr/>
         <p:txBody>
-          <a:bodyPr/>
+          <a:bodyPr>
+            <a:normAutofit/>
+          </a:bodyPr>
           <a:lstStyle/>
           <a:p>
-            <a:endParaRPr lang="en-US"/>
+            <a:pPr marL="457200" lvl="0" indent="-457200">
+              <a:buFont typeface="+mj-lt"/>
+              <a:buAutoNum type="arabicPeriod"/>
+            </a:pPr>
+            <a:r>
+              <a:rPr lang="en-US" dirty="0"/>
+              <a:t>Web GUI with React.js (and Bootstrap)</a:t>
+            </a:r>
+          </a:p>
+          <a:p>
+            <a:pPr marL="457200" indent="-457200">
+              <a:buFont typeface="+mj-lt"/>
+              <a:buAutoNum type="arabicPeriod"/>
+            </a:pPr>
+            <a:r>
+              <a:rPr lang="en-US" dirty="0"/>
+              <a:t>MSSQL Database for the Data</a:t>
+            </a:r>
+          </a:p>
+          <a:p>
+            <a:pPr marL="457200" lvl="0" indent="-457200">
+              <a:buFont typeface="+mj-lt"/>
+              <a:buAutoNum type="arabicPeriod"/>
+            </a:pPr>
+            <a:r>
+              <a:rPr lang="en-US" dirty="0"/>
+              <a:t>Function to log in to the website</a:t>
+            </a:r>
+          </a:p>
+          <a:p>
+            <a:pPr marL="457200" lvl="0" indent="-457200">
+              <a:buFont typeface="+mj-lt"/>
+              <a:buAutoNum type="arabicPeriod"/>
+            </a:pPr>
+            <a:r>
+              <a:rPr lang="en-US" dirty="0"/>
+              <a:t>Function to export filtered data</a:t>
+            </a:r>
+          </a:p>
+          <a:p>
+            <a:pPr marL="457200" lvl="0" indent="-457200">
+              <a:buFont typeface="+mj-lt"/>
+              <a:buAutoNum type="arabicPeriod"/>
+            </a:pPr>
+            <a:r>
+              <a:rPr lang="en-US" dirty="0"/>
+              <a:t>An Admin page to delete Accounts and manage the database</a:t>
+            </a:r>
+          </a:p>
+          <a:p>
+            <a:pPr marL="457200" lvl="0" indent="-457200">
+              <a:buFont typeface="+mj-lt"/>
+              <a:buAutoNum type="arabicPeriod"/>
+            </a:pPr>
+            <a:r>
+              <a:rPr lang="en-US" dirty="0"/>
+              <a:t>Import bank statement in CSV Format</a:t>
+            </a:r>
           </a:p>
         </p:txBody>
       </p:sp>
     </p:spTree>
+    <p:extLst>
+      <p:ext uri="{BB962C8B-B14F-4D97-AF65-F5344CB8AC3E}">
+        <p14:creationId xmlns:p14="http://schemas.microsoft.com/office/powerpoint/2010/main" val="1725682998"/>
+      </p:ext>
+    </p:extLst>
   </p:cSld>
   <p:clrMapOvr>
     <a:masterClrMapping/>
   </p:clrMapOvr>
-  <mc:AlternateContent xmlns:mc="http://schemas.openxmlformats.org/markup-compatibility/2006" xmlns:p14="http://schemas.microsoft.com/office/powerpoint/2010/main">
-    <mc:Choice Requires="p14">
+  <mc:AlternateContent xmlns:mc="http://schemas.openxmlformats.org/markup-compatibility/2006">
+    <mc:Choice xmlns:p14="http://schemas.microsoft.com/office/powerpoint/2010/main" Requires="p14">
       <p:transition spd="med" p14:dur="700">
         <p:fade/>
       </p:transition>
     </mc:Choice>
-    <mc:Fallback xmlns="">
+    <mc:Fallback>
       <p:transition spd="med">
         <p:fade/>
       </p:transition>

</xml_diff>